<commit_message>
update packages, compute PCA
</commit_message>
<xml_diff>
--- a/outputs/trait-correlations_arranged.pptx
+++ b/outputs/trait-correlations_arranged.pptx
@@ -311,7 +311,7 @@
           <a:p>
             <a:fld id="{6BA5D40C-A8DC-479A-A5D3-E7B4936A184B}" type="datetimeFigureOut">
               <a:rPr lang="en-GB" smtClean="0"/>
-              <a:t>25/10/2021</a:t>
+              <a:t>26/10/2021</a:t>
             </a:fld>
             <a:endParaRPr lang="en-GB"/>
           </a:p>
@@ -481,7 +481,7 @@
           <a:p>
             <a:fld id="{6BA5D40C-A8DC-479A-A5D3-E7B4936A184B}" type="datetimeFigureOut">
               <a:rPr lang="en-GB" smtClean="0"/>
-              <a:t>25/10/2021</a:t>
+              <a:t>26/10/2021</a:t>
             </a:fld>
             <a:endParaRPr lang="en-GB"/>
           </a:p>
@@ -661,7 +661,7 @@
           <a:p>
             <a:fld id="{6BA5D40C-A8DC-479A-A5D3-E7B4936A184B}" type="datetimeFigureOut">
               <a:rPr lang="en-GB" smtClean="0"/>
-              <a:t>25/10/2021</a:t>
+              <a:t>26/10/2021</a:t>
             </a:fld>
             <a:endParaRPr lang="en-GB"/>
           </a:p>
@@ -831,7 +831,7 @@
           <a:p>
             <a:fld id="{6BA5D40C-A8DC-479A-A5D3-E7B4936A184B}" type="datetimeFigureOut">
               <a:rPr lang="en-GB" smtClean="0"/>
-              <a:t>25/10/2021</a:t>
+              <a:t>26/10/2021</a:t>
             </a:fld>
             <a:endParaRPr lang="en-GB"/>
           </a:p>
@@ -1077,7 +1077,7 @@
           <a:p>
             <a:fld id="{6BA5D40C-A8DC-479A-A5D3-E7B4936A184B}" type="datetimeFigureOut">
               <a:rPr lang="en-GB" smtClean="0"/>
-              <a:t>25/10/2021</a:t>
+              <a:t>26/10/2021</a:t>
             </a:fld>
             <a:endParaRPr lang="en-GB"/>
           </a:p>
@@ -1365,7 +1365,7 @@
           <a:p>
             <a:fld id="{6BA5D40C-A8DC-479A-A5D3-E7B4936A184B}" type="datetimeFigureOut">
               <a:rPr lang="en-GB" smtClean="0"/>
-              <a:t>25/10/2021</a:t>
+              <a:t>26/10/2021</a:t>
             </a:fld>
             <a:endParaRPr lang="en-GB"/>
           </a:p>
@@ -1792,7 +1792,7 @@
           <a:p>
             <a:fld id="{6BA5D40C-A8DC-479A-A5D3-E7B4936A184B}" type="datetimeFigureOut">
               <a:rPr lang="en-GB" smtClean="0"/>
-              <a:t>25/10/2021</a:t>
+              <a:t>26/10/2021</a:t>
             </a:fld>
             <a:endParaRPr lang="en-GB"/>
           </a:p>
@@ -1910,7 +1910,7 @@
           <a:p>
             <a:fld id="{6BA5D40C-A8DC-479A-A5D3-E7B4936A184B}" type="datetimeFigureOut">
               <a:rPr lang="en-GB" smtClean="0"/>
-              <a:t>25/10/2021</a:t>
+              <a:t>26/10/2021</a:t>
             </a:fld>
             <a:endParaRPr lang="en-GB"/>
           </a:p>
@@ -2005,7 +2005,7 @@
           <a:p>
             <a:fld id="{6BA5D40C-A8DC-479A-A5D3-E7B4936A184B}" type="datetimeFigureOut">
               <a:rPr lang="en-GB" smtClean="0"/>
-              <a:t>25/10/2021</a:t>
+              <a:t>26/10/2021</a:t>
             </a:fld>
             <a:endParaRPr lang="en-GB"/>
           </a:p>
@@ -2282,7 +2282,7 @@
           <a:p>
             <a:fld id="{6BA5D40C-A8DC-479A-A5D3-E7B4936A184B}" type="datetimeFigureOut">
               <a:rPr lang="en-GB" smtClean="0"/>
-              <a:t>25/10/2021</a:t>
+              <a:t>26/10/2021</a:t>
             </a:fld>
             <a:endParaRPr lang="en-GB"/>
           </a:p>
@@ -2535,7 +2535,7 @@
           <a:p>
             <a:fld id="{6BA5D40C-A8DC-479A-A5D3-E7B4936A184B}" type="datetimeFigureOut">
               <a:rPr lang="en-GB" smtClean="0"/>
-              <a:t>25/10/2021</a:t>
+              <a:t>26/10/2021</a:t>
             </a:fld>
             <a:endParaRPr lang="en-GB"/>
           </a:p>
@@ -2748,7 +2748,7 @@
           <a:p>
             <a:fld id="{6BA5D40C-A8DC-479A-A5D3-E7B4936A184B}" type="datetimeFigureOut">
               <a:rPr lang="en-GB" smtClean="0"/>
-              <a:t>25/10/2021</a:t>
+              <a:t>26/10/2021</a:t>
             </a:fld>
             <a:endParaRPr lang="en-GB"/>
           </a:p>
@@ -23364,6 +23364,13 @@
   <p:clrMapOvr>
     <a:masterClrMapping/>
   </p:clrMapOvr>
+  <p:timing>
+    <p:tnLst>
+      <p:par>
+        <p:cTn id="1" dur="indefinite" restart="never" nodeType="tmRoot"/>
+      </p:par>
+    </p:tnLst>
+  </p:timing>
 </p:sld>
 </file>
 

</xml_diff>